<commit_message>
updated figures in SoSDD
</commit_message>
<xml_diff>
--- a/documentation/Quick-Start-Guide-M2.pptx
+++ b/documentation/Quick-Start-Guide-M2.pptx
@@ -577,6 +577,90 @@
 </file>
 
 <file path=ppt/notesSlides/notesSlide2.xml><?xml version="1.0" encoding="utf-8"?>
+<p:notes xmlns:a="http://schemas.openxmlformats.org/drawingml/2006/main" xmlns:r="http://schemas.openxmlformats.org/officeDocument/2006/relationships" xmlns:p="http://schemas.openxmlformats.org/presentationml/2006/main">
+  <p:cSld>
+    <p:spTree>
+      <p:nvGrpSpPr>
+        <p:cNvPr id="1" name=""/>
+        <p:cNvGrpSpPr/>
+        <p:nvPr/>
+      </p:nvGrpSpPr>
+      <p:grpSpPr>
+        <a:xfrm>
+          <a:off x="0" y="0"/>
+          <a:ext cx="0" cy="0"/>
+          <a:chOff x="0" y="0"/>
+          <a:chExt cx="0" cy="0"/>
+        </a:xfrm>
+      </p:grpSpPr>
+      <p:sp>
+        <p:nvSpPr>
+          <p:cNvPr id="2" name="Diakép helye 1"/>
+          <p:cNvSpPr>
+            <a:spLocks noGrp="1" noRot="1" noChangeAspect="1"/>
+          </p:cNvSpPr>
+          <p:nvPr>
+            <p:ph type="sldImg"/>
+          </p:nvPr>
+        </p:nvSpPr>
+        <p:spPr/>
+      </p:sp>
+      <p:sp>
+        <p:nvSpPr>
+          <p:cNvPr id="3" name="Jegyzetek helye 2"/>
+          <p:cNvSpPr>
+            <a:spLocks noGrp="1"/>
+          </p:cNvSpPr>
+          <p:nvPr>
+            <p:ph type="body" idx="1"/>
+          </p:nvPr>
+        </p:nvSpPr>
+        <p:spPr/>
+        <p:txBody>
+          <a:bodyPr/>
+          <a:lstStyle/>
+          <a:p>
+            <a:endParaRPr lang="hu-HU"/>
+          </a:p>
+        </p:txBody>
+      </p:sp>
+      <p:sp>
+        <p:nvSpPr>
+          <p:cNvPr id="4" name="Dia számának helye 3"/>
+          <p:cNvSpPr>
+            <a:spLocks noGrp="1"/>
+          </p:cNvSpPr>
+          <p:nvPr>
+            <p:ph type="sldNum" sz="quarter" idx="10"/>
+          </p:nvPr>
+        </p:nvSpPr>
+        <p:spPr/>
+        <p:txBody>
+          <a:bodyPr/>
+          <a:lstStyle/>
+          <a:p>
+            <a:fld id="{74D025E6-15D4-4677-B88E-023F7882E09D}" type="slidenum">
+              <a:rPr lang="hu-HU" smtClean="0"/>
+              <a:t>10</a:t>
+            </a:fld>
+            <a:endParaRPr lang="hu-HU"/>
+          </a:p>
+        </p:txBody>
+      </p:sp>
+    </p:spTree>
+    <p:extLst>
+      <p:ext uri="{BB962C8B-B14F-4D97-AF65-F5344CB8AC3E}">
+        <p14:creationId xmlns:p14="http://schemas.microsoft.com/office/powerpoint/2010/main" val="1581452232"/>
+      </p:ext>
+    </p:extLst>
+  </p:cSld>
+  <p:clrMapOvr>
+    <a:masterClrMapping/>
+  </p:clrMapOvr>
+</p:notes>
+</file>
+
+<file path=ppt/notesSlides/notesSlide3.xml><?xml version="1.0" encoding="utf-8"?>
 <p:notes xmlns:a="http://schemas.openxmlformats.org/drawingml/2006/main" xmlns:r="http://schemas.openxmlformats.org/officeDocument/2006/relationships" xmlns:p="http://schemas.openxmlformats.org/presentationml/2006/main">
   <p:cSld>
     <p:spTree>
@@ -3707,13 +3791,8 @@
             </a:r>
             <a:r>
               <a:rPr lang="hu-HU"/>
-              <a:t> </a:t>
-            </a:r>
-            <a:r>
-              <a:rPr lang="hu-HU" err="1"/>
-              <a:t>tables</a:t>
-            </a:r>
-            <a:endParaRPr lang="hu-HU"/>
+              <a:t> of the ArrowheadCloud table</a:t>
+            </a:r>
           </a:p>
         </p:txBody>
       </p:sp>
@@ -3729,816 +3808,42 @@
         </p:nvSpPr>
         <p:spPr>
           <a:xfrm>
-            <a:off x="11083" y="1035511"/>
+            <a:off x="363984" y="1036549"/>
             <a:ext cx="10515600" cy="3873840"/>
           </a:xfrm>
         </p:spPr>
         <p:txBody>
           <a:bodyPr>
-            <a:normAutofit fontScale="77500" lnSpcReduction="20000"/>
+            <a:normAutofit/>
           </a:bodyPr>
           <a:lstStyle/>
           <a:p>
             <a:pPr algn="just"/>
             <a:r>
-              <a:rPr lang="en-US" dirty="0"/>
-              <a:t>These tables can be easily modified by using </a:t>
-            </a:r>
-            <a:r>
-              <a:rPr lang="hu-HU" dirty="0" err="1"/>
-              <a:t>e.g</a:t>
-            </a:r>
-            <a:r>
-              <a:rPr lang="hu-HU" dirty="0"/>
-              <a:t>. </a:t>
-            </a:r>
-            <a:r>
-              <a:rPr lang="hu-HU" dirty="0" err="1"/>
-              <a:t>the</a:t>
-            </a:r>
-            <a:r>
-              <a:rPr lang="hu-HU" dirty="0"/>
-              <a:t> </a:t>
-            </a:r>
-            <a:r>
-              <a:rPr lang="hu-HU" dirty="0" err="1"/>
-              <a:t>MySQL</a:t>
-            </a:r>
-            <a:r>
-              <a:rPr lang="hu-HU" dirty="0"/>
-              <a:t> </a:t>
-            </a:r>
-            <a:r>
-              <a:rPr lang="hu-HU" dirty="0" err="1"/>
-              <a:t>workbench</a:t>
-            </a:r>
-            <a:r>
-              <a:rPr lang="en-US" dirty="0"/>
-              <a:t>.</a:t>
-            </a:r>
-            <a:r>
-              <a:rPr lang="hu-HU" dirty="0"/>
-              <a:t> In a </a:t>
-            </a:r>
-            <a:r>
-              <a:rPr lang="hu-HU" dirty="0" err="1"/>
-              <a:t>later</a:t>
-            </a:r>
-            <a:r>
-              <a:rPr lang="hu-HU" dirty="0"/>
-              <a:t> version REST </a:t>
-            </a:r>
-            <a:r>
-              <a:rPr lang="hu-HU" dirty="0" err="1"/>
-              <a:t>resources</a:t>
-            </a:r>
-            <a:r>
-              <a:rPr lang="hu-HU" dirty="0"/>
-              <a:t> </a:t>
-            </a:r>
-            <a:r>
-              <a:rPr lang="hu-HU" dirty="0" err="1"/>
-              <a:t>for</a:t>
-            </a:r>
-            <a:r>
-              <a:rPr lang="hu-HU" dirty="0"/>
-              <a:t> CRUD </a:t>
-            </a:r>
-            <a:r>
-              <a:rPr lang="hu-HU" dirty="0" err="1"/>
-              <a:t>operations</a:t>
-            </a:r>
-            <a:r>
-              <a:rPr lang="hu-HU" dirty="0"/>
-              <a:t> </a:t>
-            </a:r>
-            <a:r>
-              <a:rPr lang="hu-HU" dirty="0" err="1"/>
-              <a:t>will</a:t>
-            </a:r>
-            <a:r>
-              <a:rPr lang="hu-HU" dirty="0"/>
-              <a:t> </a:t>
-            </a:r>
-            <a:r>
-              <a:rPr lang="hu-HU" dirty="0" err="1"/>
-              <a:t>also</a:t>
-            </a:r>
-            <a:r>
-              <a:rPr lang="hu-HU" dirty="0"/>
-              <a:t> be </a:t>
-            </a:r>
-            <a:r>
-              <a:rPr lang="hu-HU" dirty="0" err="1"/>
-              <a:t>provided</a:t>
-            </a:r>
-            <a:r>
-              <a:rPr lang="hu-HU" dirty="0"/>
-              <a:t> </a:t>
-            </a:r>
-            <a:r>
-              <a:rPr lang="hu-HU" dirty="0" err="1"/>
-              <a:t>for</a:t>
-            </a:r>
-            <a:r>
-              <a:rPr lang="hu-HU" dirty="0"/>
-              <a:t> </a:t>
-            </a:r>
-            <a:r>
-              <a:rPr lang="hu-HU" dirty="0" err="1"/>
-              <a:t>each</a:t>
-            </a:r>
-            <a:r>
-              <a:rPr lang="hu-HU" dirty="0"/>
-              <a:t> </a:t>
-            </a:r>
-            <a:r>
-              <a:rPr lang="hu-HU" dirty="0" err="1"/>
-              <a:t>database</a:t>
-            </a:r>
-            <a:r>
-              <a:rPr lang="hu-HU" dirty="0"/>
-              <a:t> </a:t>
-            </a:r>
-            <a:r>
-              <a:rPr lang="hu-HU" dirty="0" err="1"/>
-              <a:t>table</a:t>
-            </a:r>
-            <a:r>
-              <a:rPr lang="hu-HU" dirty="0"/>
-              <a:t>.</a:t>
-            </a:r>
-          </a:p>
-          <a:p>
-            <a:r>
-              <a:rPr lang="hu-HU" dirty="0"/>
-              <a:t>The „</a:t>
-            </a:r>
-            <a:r>
-              <a:rPr lang="hu-HU" dirty="0" err="1"/>
-              <a:t>CoreSystem</a:t>
-            </a:r>
-            <a:r>
-              <a:rPr lang="hu-HU" dirty="0"/>
-              <a:t>” </a:t>
-            </a:r>
-            <a:r>
-              <a:rPr lang="hu-HU" dirty="0" err="1"/>
-              <a:t>table</a:t>
-            </a:r>
-            <a:r>
-              <a:rPr lang="hu-HU" dirty="0"/>
-              <a:t> </a:t>
-            </a:r>
-            <a:r>
-              <a:rPr lang="hu-HU" dirty="0" err="1"/>
-              <a:t>stores</a:t>
-            </a:r>
-            <a:r>
-              <a:rPr lang="hu-HU" dirty="0"/>
-              <a:t> </a:t>
-            </a:r>
-            <a:r>
-              <a:rPr lang="hu-HU" dirty="0" err="1"/>
-              <a:t>where</a:t>
-            </a:r>
-            <a:r>
-              <a:rPr lang="hu-HU" dirty="0"/>
-              <a:t> </a:t>
-            </a:r>
-            <a:r>
-              <a:rPr lang="hu-HU" dirty="0" err="1"/>
-              <a:t>each</a:t>
-            </a:r>
-            <a:r>
-              <a:rPr lang="hu-HU" dirty="0"/>
-              <a:t> </a:t>
-            </a:r>
-            <a:r>
-              <a:rPr lang="hu-HU" dirty="0" err="1"/>
-              <a:t>core</a:t>
-            </a:r>
-            <a:r>
-              <a:rPr lang="hu-HU" dirty="0"/>
-              <a:t> </a:t>
-            </a:r>
-            <a:r>
-              <a:rPr lang="hu-HU" dirty="0" err="1"/>
-              <a:t>system</a:t>
-            </a:r>
-            <a:r>
-              <a:rPr lang="hu-HU" dirty="0"/>
-              <a:t> </a:t>
-            </a:r>
-            <a:r>
-              <a:rPr lang="hu-HU" dirty="0" err="1"/>
-              <a:t>can</a:t>
-            </a:r>
-            <a:r>
-              <a:rPr lang="hu-HU" dirty="0"/>
-              <a:t> be </a:t>
-            </a:r>
-            <a:r>
-              <a:rPr lang="hu-HU" dirty="0" err="1"/>
-              <a:t>reached</a:t>
-            </a:r>
-            <a:r>
-              <a:rPr lang="hu-HU" dirty="0"/>
-              <a:t>. </a:t>
-            </a:r>
-            <a:r>
-              <a:rPr lang="hu-HU" dirty="0" err="1"/>
-              <a:t>This</a:t>
-            </a:r>
-            <a:r>
-              <a:rPr lang="hu-HU" dirty="0"/>
-              <a:t> is </a:t>
-            </a:r>
-            <a:r>
-              <a:rPr lang="hu-HU" dirty="0" err="1"/>
-              <a:t>used</a:t>
-            </a:r>
-            <a:r>
-              <a:rPr lang="hu-HU" dirty="0"/>
-              <a:t> </a:t>
-            </a:r>
-            <a:r>
-              <a:rPr lang="hu-HU" dirty="0" err="1"/>
-              <a:t>by</a:t>
-            </a:r>
-            <a:r>
-              <a:rPr lang="hu-HU" dirty="0"/>
-              <a:t> </a:t>
-            </a:r>
-            <a:r>
-              <a:rPr lang="hu-HU" dirty="0" err="1"/>
-              <a:t>the</a:t>
-            </a:r>
-            <a:r>
-              <a:rPr lang="hu-HU" dirty="0"/>
-              <a:t> </a:t>
-            </a:r>
-            <a:r>
-              <a:rPr lang="hu-HU" dirty="0" err="1"/>
-              <a:t>Core</a:t>
-            </a:r>
-            <a:r>
-              <a:rPr lang="hu-HU" dirty="0"/>
-              <a:t> Systems </a:t>
-            </a:r>
-            <a:r>
-              <a:rPr lang="hu-HU" dirty="0" err="1"/>
-              <a:t>for</a:t>
-            </a:r>
-            <a:r>
-              <a:rPr lang="hu-HU" dirty="0"/>
-              <a:t> </a:t>
-            </a:r>
-            <a:r>
-              <a:rPr lang="hu-HU" dirty="0" err="1"/>
-              <a:t>locating</a:t>
-            </a:r>
-            <a:r>
-              <a:rPr lang="hu-HU" dirty="0"/>
-              <a:t> </a:t>
-            </a:r>
-            <a:r>
-              <a:rPr lang="hu-HU" dirty="0" err="1"/>
-              <a:t>other</a:t>
-            </a:r>
-            <a:r>
-              <a:rPr lang="hu-HU" dirty="0"/>
-              <a:t> </a:t>
-            </a:r>
-            <a:r>
-              <a:rPr lang="hu-HU" dirty="0" err="1"/>
-              <a:t>Core</a:t>
-            </a:r>
-            <a:r>
-              <a:rPr lang="hu-HU" dirty="0"/>
-              <a:t> Systems. </a:t>
-            </a:r>
-          </a:p>
-          <a:p>
-            <a:r>
-              <a:rPr lang="hu-HU" dirty="0" err="1"/>
-              <a:t>For</a:t>
-            </a:r>
-            <a:r>
-              <a:rPr lang="hu-HU" dirty="0"/>
-              <a:t> </a:t>
-            </a:r>
-            <a:r>
-              <a:rPr lang="hu-HU" dirty="0" err="1"/>
-              <a:t>example</a:t>
-            </a:r>
-            <a:r>
-              <a:rPr lang="hu-HU" dirty="0"/>
-              <a:t> </a:t>
-            </a:r>
-            <a:r>
-              <a:rPr lang="hu-HU" dirty="0" err="1"/>
-              <a:t>if</a:t>
-            </a:r>
-            <a:r>
-              <a:rPr lang="hu-HU" dirty="0"/>
-              <a:t> </a:t>
-            </a:r>
-            <a:r>
-              <a:rPr lang="hu-HU" dirty="0" err="1"/>
-              <a:t>we</a:t>
-            </a:r>
-            <a:r>
-              <a:rPr lang="hu-HU" dirty="0"/>
-              <a:t> start </a:t>
-            </a:r>
-            <a:r>
-              <a:rPr lang="hu-HU" dirty="0" err="1"/>
-              <a:t>the</a:t>
-            </a:r>
-            <a:r>
-              <a:rPr lang="hu-HU" dirty="0"/>
-              <a:t> </a:t>
-            </a:r>
-            <a:r>
-              <a:rPr lang="hu-HU" dirty="0" err="1"/>
-              <a:t>Authorization</a:t>
-            </a:r>
-            <a:r>
-              <a:rPr lang="hu-HU" dirty="0"/>
-              <a:t> server </a:t>
-            </a:r>
-            <a:r>
-              <a:rPr lang="hu-HU" dirty="0" err="1"/>
-              <a:t>at</a:t>
-            </a:r>
-            <a:r>
-              <a:rPr lang="hu-HU" dirty="0"/>
-              <a:t> </a:t>
-            </a:r>
-            <a:r>
-              <a:rPr lang="hu-HU" dirty="0">
-                <a:hlinkClick r:id="rId2"/>
-              </a:rPr>
-              <a:t>https://example.org:8080/endpoint/</a:t>
-            </a:r>
-            <a:r>
-              <a:rPr lang="hu-HU" dirty="0"/>
-              <a:t> , </a:t>
-            </a:r>
-            <a:r>
-              <a:rPr lang="hu-HU" dirty="0" err="1"/>
-              <a:t>then</a:t>
-            </a:r>
-            <a:r>
-              <a:rPr lang="hu-HU" dirty="0"/>
-              <a:t> </a:t>
-            </a:r>
-            <a:r>
-              <a:rPr lang="hu-HU" dirty="0" err="1"/>
-              <a:t>its</a:t>
-            </a:r>
-            <a:r>
-              <a:rPr lang="hu-HU" dirty="0"/>
-              <a:t> </a:t>
-            </a:r>
-            <a:r>
-              <a:rPr lang="hu-HU" dirty="0" err="1"/>
-              <a:t>CoreSystem</a:t>
-            </a:r>
-            <a:r>
-              <a:rPr lang="hu-HU" dirty="0"/>
-              <a:t> </a:t>
-            </a:r>
-            <a:r>
-              <a:rPr lang="hu-HU" dirty="0" err="1"/>
-              <a:t>table</a:t>
-            </a:r>
-            <a:r>
-              <a:rPr lang="hu-HU" dirty="0"/>
-              <a:t> </a:t>
-            </a:r>
-            <a:r>
-              <a:rPr lang="hu-HU" dirty="0" err="1"/>
-              <a:t>entry</a:t>
-            </a:r>
-            <a:r>
-              <a:rPr lang="hu-HU" dirty="0"/>
-              <a:t> is </a:t>
-            </a:r>
-            <a:r>
-              <a:rPr lang="hu-HU" dirty="0" err="1"/>
-              <a:t>the</a:t>
-            </a:r>
-            <a:r>
-              <a:rPr lang="hu-HU" dirty="0"/>
-              <a:t> </a:t>
-            </a:r>
-            <a:r>
-              <a:rPr lang="hu-HU" dirty="0" err="1"/>
-              <a:t>following</a:t>
-            </a:r>
-            <a:r>
-              <a:rPr lang="hu-HU" dirty="0"/>
-              <a:t>:</a:t>
-            </a:r>
-          </a:p>
-          <a:p>
-            <a:pPr lvl="1"/>
-            <a:r>
-              <a:rPr lang="hu-HU" b="1" dirty="0" err="1"/>
-              <a:t>Note</a:t>
-            </a:r>
-            <a:r>
-              <a:rPr lang="hu-HU" b="1" dirty="0"/>
-              <a:t>: </a:t>
-            </a:r>
-            <a:r>
-              <a:rPr lang="hu-HU" b="1" dirty="0" err="1"/>
-              <a:t>the</a:t>
-            </a:r>
-            <a:r>
-              <a:rPr lang="hu-HU" b="1" dirty="0"/>
-              <a:t> </a:t>
-            </a:r>
-            <a:r>
-              <a:rPr lang="hu-HU" b="1" dirty="0" err="1"/>
-              <a:t>system_name</a:t>
-            </a:r>
-            <a:r>
-              <a:rPr lang="hu-HU" b="1" dirty="0"/>
-              <a:t> </a:t>
-            </a:r>
-            <a:r>
-              <a:rPr lang="hu-HU" b="1" dirty="0" err="1"/>
-              <a:t>field</a:t>
-            </a:r>
-            <a:r>
-              <a:rPr lang="hu-HU" b="1" dirty="0"/>
-              <a:t> is </a:t>
-            </a:r>
-            <a:r>
-              <a:rPr lang="hu-HU" b="1" dirty="0" err="1"/>
-              <a:t>not</a:t>
-            </a:r>
-            <a:r>
-              <a:rPr lang="hu-HU" b="1" dirty="0"/>
-              <a:t> </a:t>
-            </a:r>
-            <a:r>
-              <a:rPr lang="hu-HU" b="1" dirty="0" err="1"/>
-              <a:t>to</a:t>
-            </a:r>
-            <a:r>
-              <a:rPr lang="hu-HU" b="1" dirty="0"/>
-              <a:t> be </a:t>
-            </a:r>
-            <a:r>
-              <a:rPr lang="hu-HU" b="1" dirty="0" err="1"/>
-              <a:t>changed</a:t>
-            </a:r>
-            <a:r>
-              <a:rPr lang="hu-HU" dirty="0"/>
-              <a:t>.</a:t>
-            </a:r>
-          </a:p>
-          <a:p>
-            <a:pPr lvl="1"/>
-            <a:r>
-              <a:rPr lang="hu-HU" dirty="0"/>
-              <a:t>The </a:t>
-            </a:r>
-            <a:r>
-              <a:rPr lang="hu-HU" b="1" i="1" dirty="0" err="1"/>
-              <a:t>service_uri</a:t>
-            </a:r>
-            <a:r>
-              <a:rPr lang="hu-HU" dirty="0"/>
-              <a:t> </a:t>
-            </a:r>
-            <a:r>
-              <a:rPr lang="hu-HU" dirty="0" err="1"/>
-              <a:t>contains</a:t>
-            </a:r>
-            <a:r>
-              <a:rPr lang="hu-HU" dirty="0"/>
-              <a:t> </a:t>
-            </a:r>
-            <a:r>
-              <a:rPr lang="hu-HU" dirty="0" err="1"/>
-              <a:t>the</a:t>
-            </a:r>
-            <a:r>
-              <a:rPr lang="hu-HU" dirty="0"/>
-              <a:t> </a:t>
-            </a:r>
-            <a:r>
-              <a:rPr lang="hu-HU" dirty="0" err="1"/>
-              <a:t>full</a:t>
-            </a:r>
-            <a:r>
-              <a:rPr lang="hu-HU" dirty="0"/>
-              <a:t> URL </a:t>
-            </a:r>
-            <a:r>
-              <a:rPr lang="hu-HU" dirty="0" err="1"/>
-              <a:t>path</a:t>
-            </a:r>
-            <a:r>
-              <a:rPr lang="hu-HU" dirty="0"/>
-              <a:t> (</a:t>
-            </a:r>
-            <a:r>
-              <a:rPr lang="hu-HU" dirty="0" err="1"/>
-              <a:t>after</a:t>
-            </a:r>
-            <a:r>
-              <a:rPr lang="hu-HU" dirty="0"/>
-              <a:t> </a:t>
-            </a:r>
-            <a:r>
-              <a:rPr lang="hu-HU" dirty="0" err="1"/>
-              <a:t>the</a:t>
-            </a:r>
-            <a:r>
-              <a:rPr lang="hu-HU" dirty="0"/>
-              <a:t> port </a:t>
-            </a:r>
-            <a:r>
-              <a:rPr lang="hu-HU" dirty="0" err="1"/>
-              <a:t>number</a:t>
-            </a:r>
-            <a:r>
-              <a:rPr lang="hu-HU" dirty="0"/>
-              <a:t>)</a:t>
-            </a:r>
-          </a:p>
-          <a:p>
-            <a:pPr lvl="1"/>
-            <a:r>
-              <a:rPr lang="hu-HU" dirty="0"/>
-              <a:t>The </a:t>
-            </a:r>
-            <a:r>
-              <a:rPr lang="hu-HU" b="1" i="1" dirty="0" err="1"/>
-              <a:t>is_secure</a:t>
-            </a:r>
-            <a:r>
-              <a:rPr lang="hu-HU" b="1" i="1" dirty="0"/>
-              <a:t> </a:t>
-            </a:r>
-            <a:r>
-              <a:rPr lang="hu-HU" dirty="0" err="1"/>
-              <a:t>boolean</a:t>
-            </a:r>
-            <a:r>
-              <a:rPr lang="hu-HU" dirty="0"/>
-              <a:t> is </a:t>
-            </a:r>
-            <a:r>
-              <a:rPr lang="hu-HU" dirty="0" err="1"/>
-              <a:t>indicating</a:t>
-            </a:r>
-            <a:r>
-              <a:rPr lang="hu-HU" dirty="0"/>
-              <a:t> </a:t>
-            </a:r>
-            <a:r>
-              <a:rPr lang="hu-HU" dirty="0" err="1"/>
-              <a:t>that</a:t>
-            </a:r>
-            <a:r>
-              <a:rPr lang="hu-HU" dirty="0"/>
-              <a:t> </a:t>
-            </a:r>
-            <a:r>
-              <a:rPr lang="hu-HU" dirty="0" err="1"/>
-              <a:t>the</a:t>
-            </a:r>
-            <a:r>
-              <a:rPr lang="hu-HU" dirty="0"/>
-              <a:t> </a:t>
-            </a:r>
-            <a:r>
-              <a:rPr lang="hu-HU" dirty="0" err="1"/>
-              <a:t>Authorization</a:t>
-            </a:r>
-            <a:r>
-              <a:rPr lang="hu-HU" dirty="0"/>
-              <a:t> System is </a:t>
-            </a:r>
-            <a:r>
-              <a:rPr lang="hu-HU" dirty="0" err="1"/>
-              <a:t>started</a:t>
-            </a:r>
-            <a:r>
-              <a:rPr lang="hu-HU" dirty="0"/>
-              <a:t> in </a:t>
-            </a:r>
-            <a:r>
-              <a:rPr lang="hu-HU" dirty="0" err="1"/>
-              <a:t>secure</a:t>
-            </a:r>
-            <a:r>
-              <a:rPr lang="hu-HU" dirty="0"/>
-              <a:t> </a:t>
-            </a:r>
-            <a:r>
-              <a:rPr lang="hu-HU" dirty="0" err="1"/>
-              <a:t>mode</a:t>
-            </a:r>
-            <a:r>
-              <a:rPr lang="hu-HU" dirty="0"/>
-              <a:t> (SSL)</a:t>
-            </a:r>
-          </a:p>
-          <a:p>
-            <a:pPr lvl="1"/>
-            <a:r>
-              <a:rPr lang="hu-HU" dirty="0" err="1"/>
-              <a:t>There</a:t>
-            </a:r>
-            <a:r>
-              <a:rPr lang="hu-HU" dirty="0"/>
-              <a:t> </a:t>
-            </a:r>
-            <a:r>
-              <a:rPr lang="hu-HU" dirty="0" err="1"/>
-              <a:t>are</a:t>
-            </a:r>
-            <a:r>
-              <a:rPr lang="hu-HU" dirty="0"/>
-              <a:t> </a:t>
-            </a:r>
-            <a:r>
-              <a:rPr lang="hu-HU" dirty="0" err="1"/>
-              <a:t>hardcoded</a:t>
-            </a:r>
-            <a:r>
-              <a:rPr lang="hu-HU" dirty="0"/>
-              <a:t> URL </a:t>
-            </a:r>
-            <a:r>
-              <a:rPr lang="hu-HU" dirty="0" err="1"/>
-              <a:t>subpaths</a:t>
-            </a:r>
-            <a:r>
-              <a:rPr lang="hu-HU" dirty="0"/>
-              <a:t> in </a:t>
-            </a:r>
-            <a:r>
-              <a:rPr lang="hu-HU" dirty="0" err="1"/>
-              <a:t>the</a:t>
-            </a:r>
-            <a:r>
-              <a:rPr lang="hu-HU" dirty="0"/>
-              <a:t> java </a:t>
-            </a:r>
-            <a:r>
-              <a:rPr lang="hu-HU" dirty="0" err="1"/>
-              <a:t>modules</a:t>
-            </a:r>
-            <a:r>
-              <a:rPr lang="hu-HU" dirty="0"/>
-              <a:t>, </a:t>
-            </a:r>
-            <a:r>
-              <a:rPr lang="hu-HU" dirty="0" err="1"/>
-              <a:t>e.g</a:t>
-            </a:r>
-            <a:r>
-              <a:rPr lang="hu-HU" dirty="0"/>
-              <a:t>. „/</a:t>
-            </a:r>
-            <a:r>
-              <a:rPr lang="hu-HU" dirty="0" err="1"/>
-              <a:t>authorization</a:t>
-            </a:r>
-            <a:r>
-              <a:rPr lang="hu-HU" dirty="0"/>
-              <a:t>”.</a:t>
-            </a:r>
-          </a:p>
-          <a:p>
-            <a:pPr lvl="1"/>
-            <a:r>
-              <a:rPr lang="hu-HU" dirty="0" err="1"/>
-              <a:t>This</a:t>
-            </a:r>
-            <a:r>
-              <a:rPr lang="hu-HU" dirty="0"/>
-              <a:t> has </a:t>
-            </a:r>
-            <a:r>
-              <a:rPr lang="hu-HU" dirty="0" err="1"/>
-              <a:t>to</a:t>
-            </a:r>
-            <a:r>
-              <a:rPr lang="hu-HU" dirty="0"/>
-              <a:t> be in </a:t>
-            </a:r>
-            <a:r>
-              <a:rPr lang="hu-HU" dirty="0" err="1"/>
-              <a:t>accordance</a:t>
-            </a:r>
-            <a:r>
-              <a:rPr lang="hu-HU" dirty="0"/>
-              <a:t> </a:t>
-            </a:r>
-            <a:r>
-              <a:rPr lang="hu-HU" dirty="0" err="1"/>
-              <a:t>with</a:t>
-            </a:r>
-            <a:r>
-              <a:rPr lang="hu-HU" dirty="0"/>
-              <a:t> </a:t>
-            </a:r>
-            <a:r>
-              <a:rPr lang="hu-HU" dirty="0" err="1"/>
-              <a:t>the</a:t>
-            </a:r>
-            <a:r>
-              <a:rPr lang="hu-HU" dirty="0"/>
-              <a:t> </a:t>
-            </a:r>
-            <a:r>
-              <a:rPr lang="hu-HU" dirty="0" err="1"/>
-              <a:t>settings</a:t>
-            </a:r>
-            <a:r>
-              <a:rPr lang="hu-HU" dirty="0"/>
-              <a:t> in </a:t>
-            </a:r>
-            <a:r>
-              <a:rPr lang="hu-HU" dirty="0" err="1"/>
-              <a:t>the</a:t>
-            </a:r>
-            <a:r>
-              <a:rPr lang="hu-HU" dirty="0"/>
-              <a:t> </a:t>
-            </a:r>
-            <a:r>
-              <a:rPr lang="hu-HU" dirty="0" err="1"/>
-              <a:t>app.properties</a:t>
-            </a:r>
-            <a:r>
-              <a:rPr lang="hu-HU" dirty="0"/>
-              <a:t> of </a:t>
-            </a:r>
-            <a:r>
-              <a:rPr lang="hu-HU" dirty="0" err="1"/>
-              <a:t>the</a:t>
-            </a:r>
-            <a:r>
-              <a:rPr lang="hu-HU" dirty="0"/>
-              <a:t> </a:t>
-            </a:r>
-            <a:r>
-              <a:rPr lang="hu-HU" dirty="0" err="1"/>
-              <a:t>authorization</a:t>
-            </a:r>
-            <a:r>
-              <a:rPr lang="hu-HU" dirty="0"/>
-              <a:t>: </a:t>
-            </a:r>
-          </a:p>
-          <a:p>
-            <a:pPr lvl="2"/>
-            <a:r>
-              <a:rPr lang="en-US" i="1" dirty="0" err="1"/>
-              <a:t>base_uri_secured</a:t>
-            </a:r>
-            <a:r>
-              <a:rPr lang="en-US" i="1" dirty="0"/>
-              <a:t>=https://</a:t>
-            </a:r>
-            <a:r>
-              <a:rPr lang="hu-HU" i="1" dirty="0"/>
-              <a:t>example.org</a:t>
-            </a:r>
-            <a:r>
-              <a:rPr lang="en-US" i="1" dirty="0"/>
-              <a:t>:8</a:t>
-            </a:r>
-            <a:r>
-              <a:rPr lang="hu-HU" i="1" dirty="0"/>
-              <a:t>080</a:t>
-            </a:r>
-            <a:r>
-              <a:rPr lang="en-US" i="1" dirty="0"/>
-              <a:t>/</a:t>
-            </a:r>
-            <a:r>
-              <a:rPr lang="hu-HU" i="1" dirty="0" err="1"/>
-              <a:t>endpoint</a:t>
-            </a:r>
-            <a:endParaRPr lang="hu-HU" i="1" dirty="0"/>
-          </a:p>
-          <a:p>
-            <a:pPr lvl="1"/>
-            <a:endParaRPr lang="hu-HU" dirty="0"/>
-          </a:p>
-          <a:p>
+              <a:rPr lang="hu-HU"/>
+              <a:t>Contains all the ArrowheadCloud (gatekeeper) information available to the Core Systems, including:</a:t>
+            </a:r>
+          </a:p>
+          <a:p>
+            <a:pPr lvl="1" algn="just"/>
+            <a:r>
+              <a:rPr lang="hu-HU"/>
+              <a:t>Own Cloud: information about the local Cloud</a:t>
+            </a:r>
+          </a:p>
+          <a:p>
+            <a:pPr lvl="1" algn="just"/>
+            <a:r>
+              <a:rPr lang="hu-HU"/>
+              <a:t>Neighborhood: list of trusted Clouds to do GlobalServiceDiscovery with</a:t>
+            </a:r>
+          </a:p>
+          <a:p>
+            <a:pPr algn="just"/>
+            <a:r>
+              <a:rPr lang="hu-HU"/>
+              <a:t>For inter-Cloud orchestration, the Gatekeeper addresses in this table has to be updated to available addresses in the setup environment. This can be done through the MySQL workbench directly, or through REST resource of the framework.</a:t>
+            </a:r>
             <a:endParaRPr lang="hu-HU" dirty="0"/>
           </a:p>
           <a:p>
@@ -4554,7 +3859,13 @@
       </p:sp>
       <p:pic>
         <p:nvPicPr>
-          <p:cNvPr id="5" name="Kép 4"/>
+          <p:cNvPr id="8" name="Kép 7">
+            <a:extLst>
+              <a:ext uri="{FF2B5EF4-FFF2-40B4-BE49-F238E27FC236}">
+                <a16:creationId xmlns:a16="http://schemas.microsoft.com/office/drawing/2014/main" id="{72B562E9-0DB2-4BA9-BDE4-812222AAEDE9}"/>
+              </a:ext>
+            </a:extLst>
+          </p:cNvPr>
           <p:cNvPicPr>
             <a:picLocks noChangeAspect="1"/>
           </p:cNvPicPr>
@@ -4568,243 +3879,8 @@
         </p:blipFill>
         <p:spPr>
           <a:xfrm>
-            <a:off x="10526683" y="221828"/>
-            <a:ext cx="1444610" cy="1933820"/>
-          </a:xfrm>
-          <a:prstGeom prst="rect">
-            <a:avLst/>
-          </a:prstGeom>
-        </p:spPr>
-      </p:pic>
-      <p:pic>
-        <p:nvPicPr>
-          <p:cNvPr id="6" name="Kép 5"/>
-          <p:cNvPicPr>
-            <a:picLocks noChangeAspect="1"/>
-          </p:cNvPicPr>
-          <p:nvPr/>
-        </p:nvPicPr>
-        <p:blipFill>
-          <a:blip r:embed="rId4"/>
-          <a:stretch>
-            <a:fillRect/>
-          </a:stretch>
-        </p:blipFill>
-        <p:spPr>
-          <a:xfrm>
-            <a:off x="10526683" y="4401481"/>
-            <a:ext cx="1471591" cy="1964076"/>
-          </a:xfrm>
-          <a:prstGeom prst="rect">
-            <a:avLst/>
-          </a:prstGeom>
-        </p:spPr>
-      </p:pic>
-      <p:pic>
-        <p:nvPicPr>
-          <p:cNvPr id="7" name="Kép 6"/>
-          <p:cNvPicPr>
-            <a:picLocks noChangeAspect="1"/>
-          </p:cNvPicPr>
-          <p:nvPr/>
-        </p:nvPicPr>
-        <p:blipFill>
-          <a:blip r:embed="rId5"/>
-          <a:stretch>
-            <a:fillRect/>
-          </a:stretch>
-        </p:blipFill>
-        <p:spPr>
-          <a:xfrm>
-            <a:off x="10515600" y="2311655"/>
-            <a:ext cx="1454693" cy="1933819"/>
-          </a:xfrm>
-          <a:prstGeom prst="rect">
-            <a:avLst/>
-          </a:prstGeom>
-        </p:spPr>
-      </p:pic>
-      <p:sp>
-        <p:nvSpPr>
-          <p:cNvPr id="10" name="Téglalap 9"/>
-          <p:cNvSpPr/>
-          <p:nvPr/>
-        </p:nvSpPr>
-        <p:spPr>
-          <a:xfrm>
-            <a:off x="11082" y="5383519"/>
-            <a:ext cx="10251503" cy="1477328"/>
-          </a:xfrm>
-          <a:prstGeom prst="rect">
-            <a:avLst/>
-          </a:prstGeom>
-        </p:spPr>
-        <p:txBody>
-          <a:bodyPr wrap="square">
-            <a:spAutoFit/>
-          </a:bodyPr>
-          <a:lstStyle/>
-          <a:p>
-            <a:pPr marL="285750" indent="-285750" algn="just">
-              <a:buFont typeface="Arial" panose="020B0604020202020204" pitchFamily="34" charset="0"/>
-              <a:buChar char="•"/>
-            </a:pPr>
-            <a:r>
-              <a:rPr lang="hu-HU"/>
-              <a:t>The „</a:t>
-            </a:r>
-            <a:r>
-              <a:rPr lang="en-US"/>
-              <a:t>neighborhood” table references trusted Arrowhead Local Clouds. This data is used by the Gatekeeper in the inter-Cloud orchestration process. This table is a </a:t>
-            </a:r>
-            <a:r>
-              <a:rPr lang="en-US" err="1"/>
-              <a:t>sublist</a:t>
-            </a:r>
-            <a:r>
-              <a:rPr lang="en-US"/>
-              <a:t> of the </a:t>
-            </a:r>
-            <a:r>
-              <a:rPr lang="hu-HU"/>
-              <a:t>„</a:t>
-            </a:r>
-            <a:r>
-              <a:rPr lang="en-US" err="1"/>
-              <a:t>arrowhead_cloud</a:t>
-            </a:r>
-            <a:r>
-              <a:rPr lang="hu-HU"/>
-              <a:t>”</a:t>
-            </a:r>
-            <a:r>
-              <a:rPr lang="en-US"/>
-              <a:t> table.</a:t>
-            </a:r>
-          </a:p>
-          <a:p>
-            <a:pPr marL="285750" indent="-285750" algn="just">
-              <a:buFont typeface="Arial" panose="020B0604020202020204" pitchFamily="34" charset="0"/>
-              <a:buChar char="•"/>
-            </a:pPr>
-            <a:r>
-              <a:rPr lang="hu-HU"/>
-              <a:t>The </a:t>
-            </a:r>
-            <a:r>
-              <a:rPr lang="en-US" err="1"/>
-              <a:t>OwnCloud</a:t>
-            </a:r>
-            <a:r>
-              <a:rPr lang="en-US"/>
-              <a:t> table holds</a:t>
-            </a:r>
-            <a:r>
-              <a:rPr lang="hu-HU"/>
-              <a:t> </a:t>
-            </a:r>
-            <a:r>
-              <a:rPr lang="en-US"/>
-              <a:t>information about </a:t>
-            </a:r>
-            <a:r>
-              <a:rPr lang="hu-HU" err="1"/>
-              <a:t>the</a:t>
-            </a:r>
-            <a:r>
-              <a:rPr lang="hu-HU"/>
-              <a:t> Local </a:t>
-            </a:r>
-            <a:r>
-              <a:rPr lang="hu-HU" err="1"/>
-              <a:t>Cloud</a:t>
-            </a:r>
-            <a:r>
-              <a:rPr lang="hu-HU"/>
-              <a:t> </a:t>
-            </a:r>
-            <a:r>
-              <a:rPr lang="hu-HU" err="1"/>
-              <a:t>itself</a:t>
-            </a:r>
-            <a:r>
-              <a:rPr lang="hu-HU"/>
-              <a:t>. </a:t>
-            </a:r>
-            <a:r>
-              <a:rPr lang="en-US"/>
-              <a:t>This is used by the Gatekeeper </a:t>
-            </a:r>
-            <a:r>
-              <a:rPr lang="hu-HU" err="1"/>
-              <a:t>to</a:t>
-            </a:r>
-            <a:r>
-              <a:rPr lang="hu-HU"/>
-              <a:t> </a:t>
-            </a:r>
-            <a:r>
-              <a:rPr lang="hu-HU" err="1"/>
-              <a:t>identify</a:t>
-            </a:r>
-            <a:r>
-              <a:rPr lang="hu-HU"/>
-              <a:t> </a:t>
-            </a:r>
-            <a:r>
-              <a:rPr lang="hu-HU" err="1"/>
-              <a:t>what</a:t>
-            </a:r>
-            <a:r>
-              <a:rPr lang="hu-HU"/>
-              <a:t> it is </a:t>
-            </a:r>
-            <a:r>
-              <a:rPr lang="hu-HU" err="1"/>
-              <a:t>representing</a:t>
-            </a:r>
-            <a:r>
-              <a:rPr lang="hu-HU"/>
-              <a:t> in </a:t>
-            </a:r>
-            <a:r>
-              <a:rPr lang="hu-HU" err="1"/>
-              <a:t>inter-Cloud</a:t>
-            </a:r>
-            <a:r>
-              <a:rPr lang="hu-HU"/>
-              <a:t> </a:t>
-            </a:r>
-            <a:r>
-              <a:rPr lang="hu-HU" err="1"/>
-              <a:t>scenarios</a:t>
-            </a:r>
-            <a:r>
-              <a:rPr lang="hu-HU"/>
-              <a:t>. Also a sublist of the „arrowhead_cloud” table.</a:t>
-            </a:r>
-            <a:endParaRPr lang="en-US"/>
-          </a:p>
-        </p:txBody>
-      </p:sp>
-      <p:pic>
-        <p:nvPicPr>
-          <p:cNvPr id="4" name="Kép 3"/>
-          <p:cNvPicPr>
-            <a:picLocks noChangeAspect="1"/>
-          </p:cNvPicPr>
-          <p:nvPr/>
-        </p:nvPicPr>
-        <p:blipFill>
-          <a:blip r:embed="rId6"/>
-          <a:stretch>
-            <a:fillRect/>
-          </a:stretch>
-        </p:blipFill>
-        <p:spPr>
-          <a:xfrm>
-            <a:off x="155800" y="4653178"/>
-            <a:ext cx="9962066" cy="656184"/>
+            <a:off x="1305131" y="4910389"/>
+            <a:ext cx="9027590" cy="894626"/>
           </a:xfrm>
           <a:prstGeom prst="rect">
             <a:avLst/>
@@ -4882,10 +3958,15 @@
             <p:ph idx="1"/>
           </p:nvPr>
         </p:nvSpPr>
-        <p:spPr/>
+        <p:spPr>
+          <a:xfrm>
+            <a:off x="838200" y="1514764"/>
+            <a:ext cx="10515600" cy="4662199"/>
+          </a:xfrm>
+        </p:spPr>
         <p:txBody>
           <a:bodyPr>
-            <a:normAutofit lnSpcReduction="10000"/>
+            <a:normAutofit fontScale="92500" lnSpcReduction="10000"/>
           </a:bodyPr>
           <a:lstStyle/>
           <a:p>
@@ -5198,7 +4279,29 @@
             </a:r>
             <a:r>
               <a:rPr lang="hu-HU" b="1" i="1"/>
-              <a:t> modulename.jar –m both </a:t>
+              <a:t> modulename.jar –m both</a:t>
+            </a:r>
+          </a:p>
+          <a:p>
+            <a:r>
+              <a:rPr lang="hu-HU"/>
+              <a:t>The </a:t>
+            </a:r>
+            <a:r>
+              <a:rPr lang="hu-HU" b="1"/>
+              <a:t>„-d” </a:t>
+            </a:r>
+            <a:r>
+              <a:rPr lang="hu-HU"/>
+              <a:t>command line argument turns on the </a:t>
+            </a:r>
+            <a:r>
+              <a:rPr lang="hu-HU" b="1"/>
+              <a:t>debug mode</a:t>
+            </a:r>
+            <a:r>
+              <a:rPr lang="hu-HU"/>
+              <a:t>, printing every request and response payload to the console.</a:t>
             </a:r>
           </a:p>
         </p:txBody>
@@ -5426,20 +4529,8 @@
               </a:lnSpc>
             </a:pPr>
             <a:r>
-              <a:rPr lang="hu-HU" sz="2800" err="1"/>
-              <a:t>Please</a:t>
-            </a:r>
-            <a:r>
               <a:rPr lang="hu-HU" sz="2800"/>
-              <a:t> import </a:t>
-            </a:r>
-            <a:r>
-              <a:rPr lang="hu-HU" sz="2800" err="1"/>
-              <a:t>the</a:t>
-            </a:r>
-            <a:r>
-              <a:rPr lang="hu-HU" sz="2800"/>
-              <a:t> </a:t>
+              <a:t>Import the </a:t>
             </a:r>
             <a:r>
               <a:rPr lang="hu-HU" sz="2800" b="1" i="1"/>
@@ -6758,10 +5849,10 @@
       </p:sp>
       <p:pic>
         <p:nvPicPr>
-          <p:cNvPr id="3" name="Kép 2">
+          <p:cNvPr id="4" name="Kép 3">
             <a:extLst>
               <a:ext uri="{FF2B5EF4-FFF2-40B4-BE49-F238E27FC236}">
-                <a16:creationId xmlns:a16="http://schemas.microsoft.com/office/drawing/2014/main" id="{A5BE7F52-DF94-4917-BB27-43F36D5A2CA4}"/>
+                <a16:creationId xmlns:a16="http://schemas.microsoft.com/office/drawing/2014/main" id="{D5597508-658E-44D9-8EA4-9BAA508D5134}"/>
               </a:ext>
             </a:extLst>
           </p:cNvPr>
@@ -6778,8 +5869,8 @@
         </p:blipFill>
         <p:spPr>
           <a:xfrm>
-            <a:off x="1473693" y="1028492"/>
-            <a:ext cx="8729194" cy="5767364"/>
+            <a:off x="1651265" y="1010698"/>
+            <a:ext cx="8686278" cy="5446702"/>
           </a:xfrm>
           <a:prstGeom prst="rect">
             <a:avLst/>

</xml_diff>